<commit_message>
Version para revision del equipo.
</commit_message>
<xml_diff>
--- a/docs/comercial/brochure.pptx
+++ b/docs/comercial/brochure.pptx
@@ -6,11 +6,19 @@
   </p:sldMasterIdLst>
   <p:sldIdLst>
     <p:sldId id="256" r:id="rId2"/>
-    <p:sldId id="257" r:id="rId3"/>
-    <p:sldId id="261" r:id="rId4"/>
-    <p:sldId id="258" r:id="rId5"/>
-    <p:sldId id="259" r:id="rId6"/>
-    <p:sldId id="260" r:id="rId7"/>
+    <p:sldId id="262" r:id="rId3"/>
+    <p:sldId id="263" r:id="rId4"/>
+    <p:sldId id="264" r:id="rId5"/>
+    <p:sldId id="265" r:id="rId6"/>
+    <p:sldId id="257" r:id="rId7"/>
+    <p:sldId id="261" r:id="rId8"/>
+    <p:sldId id="258" r:id="rId9"/>
+    <p:sldId id="259" r:id="rId10"/>
+    <p:sldId id="266" r:id="rId11"/>
+    <p:sldId id="267" r:id="rId12"/>
+    <p:sldId id="268" r:id="rId13"/>
+    <p:sldId id="269" r:id="rId14"/>
+    <p:sldId id="260" r:id="rId15"/>
   </p:sldIdLst>
   <p:sldSz cx="9144000" cy="6858000" type="screen4x3"/>
   <p:notesSz cx="6858000" cy="9144000"/>
@@ -738,7 +746,7 @@
             <a:fld id="{DE3A2F4D-761B-49FA-B2B4-D6F123DD324B}" type="datetimeFigureOut">
               <a:rPr lang="es-CL" smtClean="0"/>
               <a:pPr/>
-              <a:t>27-07-2012</a:t>
+              <a:t>29-07-2012</a:t>
             </a:fld>
             <a:endParaRPr lang="es-CL"/>
           </a:p>
@@ -812,6 +820,9 @@
   <p:clrMapOvr>
     <a:masterClrMapping/>
   </p:clrMapOvr>
+  <p:transition spd="slow">
+    <p:fade/>
+  </p:transition>
 </p:sldLayout>
 </file>
 
@@ -936,7 +947,7 @@
             <a:fld id="{DE3A2F4D-761B-49FA-B2B4-D6F123DD324B}" type="datetimeFigureOut">
               <a:rPr lang="es-CL" smtClean="0"/>
               <a:pPr/>
-              <a:t>27-07-2012</a:t>
+              <a:t>29-07-2012</a:t>
             </a:fld>
             <a:endParaRPr lang="es-CL"/>
           </a:p>
@@ -994,6 +1005,9 @@
   <p:clrMapOvr>
     <a:masterClrMapping/>
   </p:clrMapOvr>
+  <p:transition spd="slow">
+    <p:fade/>
+  </p:transition>
 </p:sldLayout>
 </file>
 
@@ -1123,7 +1137,7 @@
             <a:fld id="{DE3A2F4D-761B-49FA-B2B4-D6F123DD324B}" type="datetimeFigureOut">
               <a:rPr lang="es-CL" smtClean="0"/>
               <a:pPr/>
-              <a:t>27-07-2012</a:t>
+              <a:t>29-07-2012</a:t>
             </a:fld>
             <a:endParaRPr lang="es-CL"/>
           </a:p>
@@ -1181,6 +1195,9 @@
   <p:clrMapOvr>
     <a:masterClrMapping/>
   </p:clrMapOvr>
+  <p:transition spd="slow">
+    <p:fade/>
+  </p:transition>
 </p:sldLayout>
 </file>
 
@@ -1275,7 +1292,7 @@
             <a:fld id="{DE3A2F4D-761B-49FA-B2B4-D6F123DD324B}" type="datetimeFigureOut">
               <a:rPr lang="es-CL" smtClean="0"/>
               <a:pPr/>
-              <a:t>27-07-2012</a:t>
+              <a:t>29-07-2012</a:t>
             </a:fld>
             <a:endParaRPr lang="es-CL"/>
           </a:p>
@@ -1358,6 +1375,9 @@
   <p:clrMapOvr>
     <a:masterClrMapping/>
   </p:clrMapOvr>
+  <p:transition spd="slow">
+    <p:fade/>
+  </p:transition>
 </p:sldLayout>
 </file>
 
@@ -1532,7 +1552,7 @@
             <a:fld id="{DE3A2F4D-761B-49FA-B2B4-D6F123DD324B}" type="datetimeFigureOut">
               <a:rPr lang="es-CL" smtClean="0"/>
               <a:pPr/>
-              <a:t>27-07-2012</a:t>
+              <a:t>29-07-2012</a:t>
             </a:fld>
             <a:endParaRPr lang="es-CL"/>
           </a:p>
@@ -1750,6 +1770,9 @@
   <p:clrMapOvr>
     <a:overrideClrMapping bg1="dk1" tx1="lt1" bg2="dk2" tx2="lt2" accent1="accent1" accent2="accent2" accent3="accent3" accent4="accent4" accent5="accent5" accent6="accent6" hlink="hlink" folHlink="folHlink"/>
   </p:clrMapOvr>
+  <p:transition spd="slow">
+    <p:fade/>
+  </p:transition>
 </p:sldLayout>
 </file>
 
@@ -1943,7 +1966,7 @@
             <a:fld id="{DE3A2F4D-761B-49FA-B2B4-D6F123DD324B}" type="datetimeFigureOut">
               <a:rPr lang="es-CL" smtClean="0"/>
               <a:pPr/>
-              <a:t>27-07-2012</a:t>
+              <a:t>29-07-2012</a:t>
             </a:fld>
             <a:endParaRPr lang="es-CL"/>
           </a:p>
@@ -2026,6 +2049,9 @@
   <p:clrMapOvr>
     <a:overrideClrMapping bg1="dk1" tx1="lt1" bg2="dk2" tx2="lt2" accent1="accent1" accent2="accent2" accent3="accent3" accent4="accent4" accent5="accent5" accent6="accent6" hlink="hlink" folHlink="folHlink"/>
   </p:clrMapOvr>
+  <p:transition spd="slow">
+    <p:fade/>
+  </p:transition>
 </p:sldLayout>
 </file>
 
@@ -2391,7 +2417,7 @@
             <a:fld id="{DE3A2F4D-761B-49FA-B2B4-D6F123DD324B}" type="datetimeFigureOut">
               <a:rPr lang="es-CL" smtClean="0"/>
               <a:pPr/>
-              <a:t>27-07-2012</a:t>
+              <a:t>29-07-2012</a:t>
             </a:fld>
             <a:endParaRPr lang="es-CL"/>
           </a:p>
@@ -2449,6 +2475,9 @@
   <p:clrMapOvr>
     <a:overrideClrMapping bg1="lt1" tx1="dk1" bg2="lt2" tx2="dk2" accent1="accent1" accent2="accent2" accent3="accent3" accent4="accent4" accent5="accent5" accent6="accent6" hlink="hlink" folHlink="folHlink"/>
   </p:clrMapOvr>
+  <p:transition spd="slow">
+    <p:fade/>
+  </p:transition>
 </p:sldLayout>
 </file>
 
@@ -2494,7 +2523,7 @@
             <a:fld id="{DE3A2F4D-761B-49FA-B2B4-D6F123DD324B}" type="datetimeFigureOut">
               <a:rPr lang="es-CL" smtClean="0"/>
               <a:pPr/>
-              <a:t>27-07-2012</a:t>
+              <a:t>29-07-2012</a:t>
             </a:fld>
             <a:endParaRPr lang="es-CL"/>
           </a:p>
@@ -2577,6 +2606,9 @@
   <p:clrMapOvr>
     <a:overrideClrMapping bg1="dk1" tx1="lt1" bg2="dk2" tx2="lt2" accent1="accent1" accent2="accent2" accent3="accent3" accent4="accent4" accent5="accent5" accent6="accent6" hlink="hlink" folHlink="folHlink"/>
   </p:clrMapOvr>
+  <p:transition spd="slow">
+    <p:fade/>
+  </p:transition>
 </p:sldLayout>
 </file>
 
@@ -2617,7 +2649,7 @@
             <a:fld id="{DE3A2F4D-761B-49FA-B2B4-D6F123DD324B}" type="datetimeFigureOut">
               <a:rPr lang="es-CL" smtClean="0"/>
               <a:pPr/>
-              <a:t>27-07-2012</a:t>
+              <a:t>29-07-2012</a:t>
             </a:fld>
             <a:endParaRPr lang="es-CL"/>
           </a:p>
@@ -2675,6 +2707,9 @@
   <p:clrMapOvr>
     <a:masterClrMapping/>
   </p:clrMapOvr>
+  <p:transition spd="slow">
+    <p:fade/>
+  </p:transition>
 </p:sldLayout>
 </file>
 
@@ -2893,7 +2928,7 @@
             <a:fld id="{DE3A2F4D-761B-49FA-B2B4-D6F123DD324B}" type="datetimeFigureOut">
               <a:rPr lang="es-CL" smtClean="0"/>
               <a:pPr/>
-              <a:t>27-07-2012</a:t>
+              <a:t>29-07-2012</a:t>
             </a:fld>
             <a:endParaRPr lang="es-CL"/>
           </a:p>
@@ -2951,6 +2986,9 @@
   <p:clrMapOvr>
     <a:overrideClrMapping bg1="lt1" tx1="dk1" bg2="lt2" tx2="dk2" accent1="accent1" accent2="accent2" accent3="accent3" accent4="accent4" accent5="accent5" accent6="accent6" hlink="hlink" folHlink="folHlink"/>
   </p:clrMapOvr>
+  <p:transition spd="slow">
+    <p:fade/>
+  </p:transition>
 </p:sldLayout>
 </file>
 
@@ -3100,7 +3138,7 @@
             <a:fld id="{DE3A2F4D-761B-49FA-B2B4-D6F123DD324B}" type="datetimeFigureOut">
               <a:rPr lang="es-CL" smtClean="0"/>
               <a:pPr/>
-              <a:t>27-07-2012</a:t>
+              <a:t>29-07-2012</a:t>
             </a:fld>
             <a:endParaRPr lang="es-CL"/>
           </a:p>
@@ -3715,6 +3753,9 @@
   <p:clrMapOvr>
     <a:overrideClrMapping bg1="dk1" tx1="lt1" bg2="dk2" tx2="lt2" accent1="accent1" accent2="accent2" accent3="accent3" accent4="accent4" accent5="accent5" accent6="accent6" hlink="hlink" folHlink="folHlink"/>
   </p:clrMapOvr>
+  <p:transition spd="slow">
+    <p:fade/>
+  </p:transition>
 </p:sldLayout>
 </file>
 
@@ -4211,7 +4252,7 @@
             <a:fld id="{DE3A2F4D-761B-49FA-B2B4-D6F123DD324B}" type="datetimeFigureOut">
               <a:rPr lang="es-CL" smtClean="0"/>
               <a:pPr/>
-              <a:t>27-07-2012</a:t>
+              <a:t>29-07-2012</a:t>
             </a:fld>
             <a:endParaRPr lang="es-CL"/>
           </a:p>
@@ -4310,6 +4351,9 @@
     <p:sldLayoutId id="2147483670" r:id="rId10"/>
     <p:sldLayoutId id="2147483671" r:id="rId11"/>
   </p:sldLayoutIdLst>
+  <p:transition spd="slow">
+    <p:fade/>
+  </p:transition>
   <p:txStyles>
     <p:titleStyle>
       <a:lvl1pPr algn="l" rtl="0" eaLnBrk="1" latinLnBrk="0" hangingPunct="1">
@@ -4685,6 +4729,9 @@
   <p:clrMapOvr>
     <a:masterClrMapping/>
   </p:clrMapOvr>
+  <p:transition spd="slow">
+    <p:fade/>
+  </p:transition>
   <p:timing>
     <p:tnLst>
       <p:par>
@@ -4695,7 +4742,7 @@
 </p:sld>
 </file>
 
-<file path=ppt/slides/slide2.xml><?xml version="1.0" encoding="utf-8"?>
+<file path=ppt/slides/slide10.xml><?xml version="1.0" encoding="utf-8"?>
 <p:sld xmlns:a="http://schemas.openxmlformats.org/drawingml/2006/main" xmlns:r="http://schemas.openxmlformats.org/officeDocument/2006/relationships" xmlns:p="http://schemas.openxmlformats.org/presentationml/2006/main">
   <p:cSld>
     <p:spTree>
@@ -4714,68 +4761,12 @@
       </p:grpSpPr>
       <p:sp>
         <p:nvSpPr>
-          <p:cNvPr id="3" name="2 Marcador de contenido"/>
+          <p:cNvPr id="2" name="1 Marcador de contenido"/>
           <p:cNvSpPr>
             <a:spLocks noGrp="1"/>
           </p:cNvSpPr>
           <p:nvPr>
             <p:ph idx="1"/>
-          </p:nvPr>
-        </p:nvSpPr>
-        <p:spPr/>
-        <p:txBody>
-          <a:bodyPr>
-            <a:noAutofit/>
-          </a:bodyPr>
-          <a:lstStyle/>
-          <a:p>
-            <a:pPr algn="just"/>
-            <a:r>
-              <a:rPr lang="es-CL" sz="2300" dirty="0" smtClean="0"/>
-              <a:t>Según la normativa </a:t>
-            </a:r>
-            <a:r>
-              <a:rPr lang="es-CL" sz="2300" dirty="0" smtClean="0"/>
-              <a:t>de la Súper </a:t>
-            </a:r>
-            <a:r>
-              <a:rPr lang="es-CL" sz="2300" dirty="0" smtClean="0"/>
-              <a:t>Intendencia de Valores y Seguros. Los estados financieros deberán prepararse de acuerdo a las Normas Internacionales de Información </a:t>
-            </a:r>
-            <a:r>
-              <a:rPr lang="es-CL" sz="2300" dirty="0" smtClean="0"/>
-              <a:t>Financiera (IFRS) emitidas por la International Accounting Standard Board (IASB</a:t>
-            </a:r>
-            <a:r>
-              <a:rPr lang="es-CL" sz="2300" dirty="0" smtClean="0"/>
-              <a:t>).</a:t>
-            </a:r>
-          </a:p>
-          <a:p>
-            <a:pPr algn="just"/>
-            <a:endParaRPr lang="es-CL" sz="2300" dirty="0" smtClean="0"/>
-          </a:p>
-          <a:p>
-            <a:pPr algn="just"/>
-            <a:r>
-              <a:rPr lang="es-CL" sz="2300" dirty="0" smtClean="0"/>
-              <a:t>Adicionalmente la SVS especifica que las entidades aseguradoras deben divulgar información que no esta directamente reflejada en dichos Estados Financieros. Esta información llamada Revelaciones deberá ser presentada con carácter de obligatoria.</a:t>
-            </a:r>
-          </a:p>
-          <a:p>
-            <a:pPr algn="just"/>
-            <a:endParaRPr lang="es-CL" sz="2300" dirty="0" smtClean="0"/>
-          </a:p>
-        </p:txBody>
-      </p:sp>
-      <p:sp>
-        <p:nvSpPr>
-          <p:cNvPr id="2" name="1 Título"/>
-          <p:cNvSpPr>
-            <a:spLocks noGrp="1"/>
-          </p:cNvSpPr>
-          <p:nvPr>
-            <p:ph type="title"/>
           </p:nvPr>
         </p:nvSpPr>
         <p:spPr/>
@@ -4783,19 +4774,97 @@
           <a:bodyPr/>
           <a:lstStyle/>
           <a:p>
+            <a:pPr algn="just"/>
+            <a:r>
+              <a:rPr lang="es-CL" dirty="0" smtClean="0">
+                <a:effectLst>
+                  <a:outerShdw blurRad="38100" dist="38100" dir="2700000" algn="tl">
+                    <a:srgbClr val="000000">
+                      <a:alpha val="43137"/>
+                    </a:srgbClr>
+                  </a:outerShdw>
+                </a:effectLst>
+              </a:rPr>
+              <a:t>Configurador de Estructuras</a:t>
+            </a:r>
             <a:r>
               <a:rPr lang="es-CL" dirty="0" smtClean="0"/>
-              <a:t>La necesidad</a:t>
+              <a:t>: Este modulo proporciona la capacidad de configurar dinámicamente las estructuras de Información según la normativa de la SVS.</a:t>
             </a:r>
             <a:endParaRPr lang="es-CL" dirty="0"/>
           </a:p>
         </p:txBody>
       </p:sp>
+      <p:sp>
+        <p:nvSpPr>
+          <p:cNvPr id="3" name="2 Título"/>
+          <p:cNvSpPr>
+            <a:spLocks noGrp="1"/>
+          </p:cNvSpPr>
+          <p:nvPr>
+            <p:ph type="title"/>
+          </p:nvPr>
+        </p:nvSpPr>
+        <p:spPr/>
+        <p:txBody>
+          <a:bodyPr/>
+          <a:lstStyle/>
+          <a:p>
+            <a:r>
+              <a:rPr lang="es-CL" dirty="0" err="1" smtClean="0"/>
+              <a:t>Modulos</a:t>
+            </a:r>
+            <a:r>
+              <a:rPr lang="es-CL" dirty="0" smtClean="0"/>
+              <a:t>.</a:t>
+            </a:r>
+            <a:endParaRPr lang="es-CL" dirty="0"/>
+          </a:p>
+        </p:txBody>
+      </p:sp>
+      <p:pic>
+        <p:nvPicPr>
+          <p:cNvPr id="4" name="Picture 6"/>
+          <p:cNvPicPr>
+            <a:picLocks noChangeAspect="1" noChangeArrowheads="1"/>
+          </p:cNvPicPr>
+          <p:nvPr/>
+        </p:nvPicPr>
+        <p:blipFill>
+          <a:blip r:embed="rId2"/>
+          <a:srcRect l="21799" t="2035" b="14518"/>
+          <a:stretch>
+            <a:fillRect/>
+          </a:stretch>
+        </p:blipFill>
+        <p:spPr bwMode="auto">
+          <a:xfrm>
+            <a:off x="3786182" y="3357562"/>
+            <a:ext cx="4100391" cy="2928958"/>
+          </a:xfrm>
+          <a:prstGeom prst="rect">
+            <a:avLst/>
+          </a:prstGeom>
+          <a:ln>
+            <a:noFill/>
+          </a:ln>
+          <a:effectLst>
+            <a:outerShdw blurRad="292100" dist="139700" dir="2700000" algn="tl" rotWithShape="0">
+              <a:srgbClr val="333333">
+                <a:alpha val="65000"/>
+              </a:srgbClr>
+            </a:outerShdw>
+          </a:effectLst>
+        </p:spPr>
+      </p:pic>
     </p:spTree>
   </p:cSld>
   <p:clrMapOvr>
     <a:masterClrMapping/>
   </p:clrMapOvr>
+  <p:transition spd="slow">
+    <p:fade/>
+  </p:transition>
   <p:timing>
     <p:tnLst>
       <p:par>
@@ -4806,7 +4875,7 @@
 </p:sld>
 </file>
 
-<file path=ppt/slides/slide3.xml><?xml version="1.0" encoding="utf-8"?>
+<file path=ppt/slides/slide11.xml><?xml version="1.0" encoding="utf-8"?>
 <p:sld xmlns:a="http://schemas.openxmlformats.org/drawingml/2006/main" xmlns:r="http://schemas.openxmlformats.org/officeDocument/2006/relationships" xmlns:p="http://schemas.openxmlformats.org/presentationml/2006/main">
   <p:cSld>
     <p:spTree>
@@ -4835,105 +4904,78 @@
         </p:nvSpPr>
         <p:spPr>
           <a:xfrm>
-            <a:off x="428596" y="500042"/>
-            <a:ext cx="8229600" cy="5386603"/>
+            <a:off x="428596" y="428604"/>
+            <a:ext cx="8229600" cy="5786478"/>
           </a:xfrm>
         </p:spPr>
         <p:txBody>
-          <a:bodyPr>
-            <a:noAutofit/>
-          </a:bodyPr>
+          <a:bodyPr/>
           <a:lstStyle/>
           <a:p>
             <a:pPr algn="just"/>
             <a:r>
-              <a:rPr lang="es-CL" sz="2200" dirty="0" smtClean="0"/>
-              <a:t>Desde el nacimiento de la normativa con la circular </a:t>
-            </a:r>
-            <a:r>
-              <a:rPr lang="es-CL" sz="2200" dirty="0" smtClean="0"/>
-              <a:t>2022 en Mayo del 2011, </a:t>
-            </a:r>
-            <a:r>
-              <a:rPr lang="es-CL" sz="2200" dirty="0" smtClean="0"/>
-              <a:t>existen hasta la fecha 3 modificaciones en </a:t>
-            </a:r>
-            <a:r>
-              <a:rPr lang="es-CL" sz="2200" dirty="0" smtClean="0"/>
-              <a:t>la definición de la normativa impactando directamente en la estructura </a:t>
-            </a:r>
-            <a:r>
-              <a:rPr lang="es-CL" sz="2200" dirty="0" smtClean="0"/>
-              <a:t>y contenido </a:t>
-            </a:r>
-            <a:r>
-              <a:rPr lang="es-CL" sz="2200" dirty="0" smtClean="0"/>
-              <a:t>de</a:t>
-            </a:r>
-            <a:r>
-              <a:rPr lang="es-CL" sz="2200" dirty="0" smtClean="0"/>
-              <a:t> las R</a:t>
-            </a:r>
-            <a:r>
-              <a:rPr lang="es-CL" sz="2200" dirty="0" smtClean="0"/>
-              <a:t>evelaciones. Esto implica </a:t>
-            </a:r>
-            <a:r>
-              <a:rPr lang="es-CL" sz="2200" dirty="0" smtClean="0"/>
-              <a:t>un alto porcentaje de variabilidad de la información que se debe </a:t>
-            </a:r>
-            <a:r>
-              <a:rPr lang="es-CL" sz="2200" dirty="0" smtClean="0"/>
-              <a:t>preparar y presentar</a:t>
-            </a:r>
-            <a:r>
-              <a:rPr lang="es-CL" sz="2200" dirty="0" smtClean="0"/>
-              <a:t>.</a:t>
-            </a:r>
-          </a:p>
-          <a:p>
-            <a:pPr algn="just"/>
-            <a:endParaRPr lang="es-CL" sz="2200" dirty="0" smtClean="0"/>
-          </a:p>
-          <a:p>
-            <a:pPr algn="just"/>
-            <a:r>
-              <a:rPr lang="es-CL" sz="2200" dirty="0" smtClean="0"/>
-              <a:t>Tomando en cuenta esta y otras atenuantes nuestra Compañía ha desarrollado un </a:t>
-            </a:r>
-            <a:r>
-              <a:rPr lang="es-CL" sz="2200" dirty="0" smtClean="0"/>
-              <a:t>producto totalmente </a:t>
-            </a:r>
-            <a:r>
-              <a:rPr lang="es-CL" sz="2200" u="sng" dirty="0" smtClean="0"/>
-              <a:t>versátil</a:t>
-            </a:r>
-            <a:r>
-              <a:rPr lang="es-CL" sz="2200" dirty="0" smtClean="0"/>
-              <a:t> </a:t>
-            </a:r>
-            <a:r>
-              <a:rPr lang="es-CL" sz="2200" dirty="0" smtClean="0"/>
-              <a:t>que se ajusta a todos los posibles escenarios impuestos por la </a:t>
-            </a:r>
-            <a:r>
-              <a:rPr lang="es-CL" sz="2200" dirty="0" smtClean="0"/>
-              <a:t>Súper Intendencia de Valores y Seguros, </a:t>
-            </a:r>
-            <a:r>
-              <a:rPr lang="es-CL" sz="2200" dirty="0" smtClean="0"/>
-              <a:t>brindando una capacidad de adaptación único a la hora de enfrentar los cambios en los modelos de entrega de la información de Revelaciones y Estados Financieros.</a:t>
-            </a:r>
-            <a:endParaRPr lang="es-CL" sz="2200" dirty="0"/>
-          </a:p>
-        </p:txBody>
-      </p:sp>
+              <a:rPr lang="es-CL" dirty="0" smtClean="0">
+                <a:effectLst>
+                  <a:outerShdw blurRad="38100" dist="38100" dir="2700000" algn="tl">
+                    <a:srgbClr val="000000">
+                      <a:alpha val="43137"/>
+                    </a:srgbClr>
+                  </a:outerShdw>
+                </a:effectLst>
+              </a:rPr>
+              <a:t>Configurador de Formulas de Calculo</a:t>
+            </a:r>
+            <a:r>
+              <a:rPr lang="es-CL" dirty="0" smtClean="0"/>
+              <a:t>: Este permite configurar las operatorias necesarias entre los campos de cada Cuadro, esto es necesario para establecer las sumas y restas de cada Revelación.</a:t>
+            </a:r>
+            <a:endParaRPr lang="es-CL" dirty="0"/>
+          </a:p>
+        </p:txBody>
+      </p:sp>
+      <p:pic>
+        <p:nvPicPr>
+          <p:cNvPr id="4" name="Picture 4"/>
+          <p:cNvPicPr>
+            <a:picLocks noChangeAspect="1" noChangeArrowheads="1"/>
+          </p:cNvPicPr>
+          <p:nvPr/>
+        </p:nvPicPr>
+        <p:blipFill>
+          <a:blip r:embed="rId2"/>
+          <a:srcRect/>
+          <a:stretch>
+            <a:fillRect/>
+          </a:stretch>
+        </p:blipFill>
+        <p:spPr bwMode="auto">
+          <a:xfrm>
+            <a:off x="2571736" y="2714620"/>
+            <a:ext cx="5929354" cy="3359081"/>
+          </a:xfrm>
+          <a:prstGeom prst="rect">
+            <a:avLst/>
+          </a:prstGeom>
+          <a:ln>
+            <a:noFill/>
+          </a:ln>
+          <a:effectLst>
+            <a:outerShdw blurRad="292100" dist="139700" dir="2700000" algn="tl" rotWithShape="0">
+              <a:srgbClr val="333333">
+                <a:alpha val="65000"/>
+              </a:srgbClr>
+            </a:outerShdw>
+          </a:effectLst>
+        </p:spPr>
+      </p:pic>
     </p:spTree>
   </p:cSld>
   <p:clrMapOvr>
     <a:masterClrMapping/>
   </p:clrMapOvr>
+  <p:transition spd="slow">
+    <p:fade/>
+  </p:transition>
   <p:timing>
     <p:tnLst>
       <p:par>
@@ -4944,7 +4986,7 @@
 </p:sld>
 </file>
 
-<file path=ppt/slides/slide4.xml><?xml version="1.0" encoding="utf-8"?>
+<file path=ppt/slides/slide12.xml><?xml version="1.0" encoding="utf-8"?>
 <p:sld xmlns:a="http://schemas.openxmlformats.org/drawingml/2006/main" xmlns:r="http://schemas.openxmlformats.org/officeDocument/2006/relationships" xmlns:p="http://schemas.openxmlformats.org/presentationml/2006/main">
   <p:cSld>
     <p:spTree>
@@ -4971,99 +5013,32 @@
             <p:ph idx="1"/>
           </p:nvPr>
         </p:nvSpPr>
-        <p:spPr/>
-        <p:txBody>
-          <a:bodyPr>
-            <a:normAutofit/>
-          </a:bodyPr>
-          <a:lstStyle/>
-          <a:p>
-            <a:r>
-              <a:rPr lang="es-CL" sz="2300" dirty="0" smtClean="0"/>
-              <a:t>Totalmente Versátil, se </a:t>
-            </a:r>
-            <a:r>
-              <a:rPr lang="es-CL" sz="2300" dirty="0" smtClean="0"/>
-              <a:t>adapta sin problemas a las distintas especificaciones de la normativa permitiendo superar sin dificultades las problemáticas asociadas </a:t>
-            </a:r>
-            <a:r>
-              <a:rPr lang="es-CL" sz="2300" dirty="0" smtClean="0"/>
-              <a:t>los cambios sobre forma y contenido de </a:t>
-            </a:r>
-            <a:r>
-              <a:rPr lang="es-CL" sz="2300" dirty="0" smtClean="0"/>
-              <a:t>las Revelaciones</a:t>
-            </a:r>
-            <a:r>
-              <a:rPr lang="es-CL" sz="2300" dirty="0" smtClean="0"/>
-              <a:t>.</a:t>
-            </a:r>
-          </a:p>
-          <a:p>
-            <a:pPr algn="just"/>
-            <a:r>
-              <a:rPr lang="es-CL" sz="2300" dirty="0" smtClean="0"/>
-              <a:t>Interfaz </a:t>
-            </a:r>
-            <a:r>
-              <a:rPr lang="es-CL" sz="2300" dirty="0" smtClean="0"/>
-              <a:t>Amigable y Usable.</a:t>
-            </a:r>
-          </a:p>
-          <a:p>
-            <a:pPr algn="just"/>
-            <a:r>
-              <a:rPr lang="es-CL" sz="2300" dirty="0" smtClean="0"/>
-              <a:t>Configurable y parametrizable.</a:t>
-            </a:r>
-          </a:p>
-          <a:p>
-            <a:pPr algn="just"/>
-            <a:r>
-              <a:rPr lang="es-CL" sz="2300" dirty="0" smtClean="0"/>
-              <a:t>Disponible en Intranet 100% Web.</a:t>
-            </a:r>
-          </a:p>
-          <a:p>
-            <a:pPr algn="just"/>
-            <a:endParaRPr lang="es-CL" sz="2300" dirty="0" smtClean="0"/>
-          </a:p>
-          <a:p>
-            <a:pPr algn="just"/>
-            <a:endParaRPr lang="es-CL" sz="2300" dirty="0" smtClean="0"/>
-          </a:p>
-          <a:p>
-            <a:pPr algn="just"/>
-            <a:endParaRPr lang="es-CL" sz="2300" dirty="0" smtClean="0"/>
-          </a:p>
-          <a:p>
-            <a:pPr algn="just"/>
-            <a:endParaRPr lang="es-CL" sz="2300" dirty="0" smtClean="0"/>
-          </a:p>
-          <a:p>
-            <a:pPr algn="just"/>
-            <a:endParaRPr lang="es-CL" sz="2300" dirty="0" smtClean="0"/>
-          </a:p>
-        </p:txBody>
-      </p:sp>
-      <p:sp>
-        <p:nvSpPr>
-          <p:cNvPr id="3" name="2 Título"/>
-          <p:cNvSpPr>
-            <a:spLocks noGrp="1"/>
-          </p:cNvSpPr>
-          <p:nvPr>
-            <p:ph type="title"/>
-          </p:nvPr>
-        </p:nvSpPr>
-        <p:spPr/>
+        <p:spPr>
+          <a:xfrm>
+            <a:off x="428596" y="428604"/>
+            <a:ext cx="8229600" cy="5786478"/>
+          </a:xfrm>
+        </p:spPr>
         <p:txBody>
           <a:bodyPr/>
           <a:lstStyle/>
           <a:p>
+            <a:pPr algn="just"/>
+            <a:r>
+              <a:rPr lang="es-CL" dirty="0" smtClean="0">
+                <a:effectLst>
+                  <a:outerShdw blurRad="38100" dist="38100" dir="2700000" algn="tl">
+                    <a:srgbClr val="000000">
+                      <a:alpha val="43137"/>
+                    </a:srgbClr>
+                  </a:outerShdw>
+                </a:effectLst>
+              </a:rPr>
+              <a:t>Cargador y Validador de Estados Financieros</a:t>
+            </a:r>
             <a:r>
               <a:rPr lang="es-CL" dirty="0" smtClean="0"/>
-              <a:t>Principales Características</a:t>
+              <a:t>: El cargador de EE.FF. Esta pensado para Ingresar al Sistema los Estados Financieros correspondientes al periodo y realizar las respectivas validaciones de las Revelaciones contra los valores de los Estados Financieros.</a:t>
             </a:r>
             <a:endParaRPr lang="es-CL" dirty="0"/>
           </a:p>
@@ -5074,6 +5049,9 @@
   <p:clrMapOvr>
     <a:masterClrMapping/>
   </p:clrMapOvr>
+  <p:transition spd="slow">
+    <p:fade/>
+  </p:transition>
   <p:timing>
     <p:tnLst>
       <p:par>
@@ -5084,7 +5062,7 @@
 </p:sld>
 </file>
 
-<file path=ppt/slides/slide5.xml><?xml version="1.0" encoding="utf-8"?>
+<file path=ppt/slides/slide13.xml><?xml version="1.0" encoding="utf-8"?>
 <p:sld xmlns:a="http://schemas.openxmlformats.org/drawingml/2006/main" xmlns:r="http://schemas.openxmlformats.org/officeDocument/2006/relationships" xmlns:p="http://schemas.openxmlformats.org/presentationml/2006/main">
   <p:cSld>
     <p:spTree>
@@ -5114,52 +5092,77 @@
         <p:spPr>
           <a:xfrm>
             <a:off x="428596" y="428604"/>
-            <a:ext cx="8229600" cy="4525963"/>
+            <a:ext cx="8229600" cy="5786478"/>
           </a:xfrm>
         </p:spPr>
         <p:txBody>
-          <a:bodyPr>
-            <a:normAutofit/>
-          </a:bodyPr>
+          <a:bodyPr/>
           <a:lstStyle/>
           <a:p>
             <a:pPr algn="just"/>
             <a:r>
-              <a:rPr lang="es-CL" sz="2300" dirty="0" smtClean="0"/>
-              <a:t>Proporciona herramientas de Control que permiten tener una visión amplia sobre el estado del completitud de la información para los periodos informados</a:t>
-            </a:r>
-            <a:r>
-              <a:rPr lang="es-CL" sz="2300" dirty="0" smtClean="0"/>
-              <a:t>.</a:t>
-            </a:r>
-          </a:p>
-          <a:p>
-            <a:pPr algn="just"/>
-            <a:endParaRPr lang="es-CL" sz="2300" dirty="0" smtClean="0"/>
-          </a:p>
-          <a:p>
-            <a:pPr algn="just"/>
-            <a:r>
-              <a:rPr lang="es-CL" sz="2300" dirty="0" smtClean="0"/>
-              <a:t>Este producto </a:t>
-            </a:r>
-            <a:r>
-              <a:rPr lang="es-CL" sz="2300" dirty="0" smtClean="0"/>
-              <a:t>entrega una solución </a:t>
-            </a:r>
-            <a:r>
-              <a:rPr lang="es-CL" sz="2300" dirty="0" smtClean="0"/>
-              <a:t>concreta a los procesos de obtención, administración, gestión y almacenamiento integral de toda la información involucrada en las Revelaciones según la norma IFRS.</a:t>
-            </a:r>
-            <a:endParaRPr lang="es-CL" sz="2300" dirty="0"/>
-          </a:p>
-        </p:txBody>
-      </p:sp>
+              <a:rPr lang="es-CL" dirty="0" smtClean="0">
+                <a:effectLst>
+                  <a:outerShdw blurRad="38100" dist="38100" dir="2700000" algn="tl">
+                    <a:srgbClr val="000000">
+                      <a:alpha val="43137"/>
+                    </a:srgbClr>
+                  </a:outerShdw>
+                </a:effectLst>
+              </a:rPr>
+              <a:t>Flujo de Aprobación</a:t>
+            </a:r>
+            <a:r>
+              <a:rPr lang="es-CL" dirty="0" smtClean="0"/>
+              <a:t>: Permite establecer un Flujo que controla el ingreso de la información para los periodos.</a:t>
+            </a:r>
+            <a:endParaRPr lang="es-CL" dirty="0"/>
+          </a:p>
+        </p:txBody>
+      </p:sp>
+      <p:pic>
+        <p:nvPicPr>
+          <p:cNvPr id="3" name="Picture 3"/>
+          <p:cNvPicPr>
+            <a:picLocks noChangeAspect="1" noChangeArrowheads="1"/>
+          </p:cNvPicPr>
+          <p:nvPr/>
+        </p:nvPicPr>
+        <p:blipFill>
+          <a:blip r:embed="rId2"/>
+          <a:srcRect b="6584"/>
+          <a:stretch>
+            <a:fillRect/>
+          </a:stretch>
+        </p:blipFill>
+        <p:spPr bwMode="auto">
+          <a:xfrm>
+            <a:off x="3643306" y="2357430"/>
+            <a:ext cx="4892051" cy="3857652"/>
+          </a:xfrm>
+          <a:prstGeom prst="rect">
+            <a:avLst/>
+          </a:prstGeom>
+          <a:ln>
+            <a:noFill/>
+          </a:ln>
+          <a:effectLst>
+            <a:outerShdw blurRad="292100" dist="139700" dir="2700000" algn="tl" rotWithShape="0">
+              <a:srgbClr val="333333">
+                <a:alpha val="65000"/>
+              </a:srgbClr>
+            </a:outerShdw>
+          </a:effectLst>
+        </p:spPr>
+      </p:pic>
     </p:spTree>
   </p:cSld>
   <p:clrMapOvr>
     <a:masterClrMapping/>
   </p:clrMapOvr>
+  <p:transition spd="slow">
+    <p:fade/>
+  </p:transition>
   <p:timing>
     <p:tnLst>
       <p:par>
@@ -5170,7 +5173,7 @@
 </p:sld>
 </file>
 
-<file path=ppt/slides/slide6.xml><?xml version="1.0" encoding="utf-8"?>
+<file path=ppt/slides/slide14.xml><?xml version="1.0" encoding="utf-8"?>
 <p:sld xmlns:a="http://schemas.openxmlformats.org/drawingml/2006/main" xmlns:r="http://schemas.openxmlformats.org/officeDocument/2006/relationships" xmlns:p="http://schemas.openxmlformats.org/presentationml/2006/main">
   <p:cSld>
     <p:spTree>
@@ -5332,6 +5335,1170 @@
   <p:clrMapOvr>
     <a:masterClrMapping/>
   </p:clrMapOvr>
+  <p:transition spd="slow">
+    <p:fade/>
+  </p:transition>
+  <p:timing>
+    <p:tnLst>
+      <p:par>
+        <p:cTn id="1" dur="indefinite" restart="never" nodeType="tmRoot"/>
+      </p:par>
+    </p:tnLst>
+  </p:timing>
+</p:sld>
+</file>
+
+<file path=ppt/slides/slide2.xml><?xml version="1.0" encoding="utf-8"?>
+<p:sld xmlns:a="http://schemas.openxmlformats.org/drawingml/2006/main" xmlns:r="http://schemas.openxmlformats.org/officeDocument/2006/relationships" xmlns:p="http://schemas.openxmlformats.org/presentationml/2006/main">
+  <p:cSld>
+    <p:spTree>
+      <p:nvGrpSpPr>
+        <p:cNvPr id="1" name=""/>
+        <p:cNvGrpSpPr/>
+        <p:nvPr/>
+      </p:nvGrpSpPr>
+      <p:grpSpPr>
+        <a:xfrm>
+          <a:off x="0" y="0"/>
+          <a:ext cx="0" cy="0"/>
+          <a:chOff x="0" y="0"/>
+          <a:chExt cx="0" cy="0"/>
+        </a:xfrm>
+      </p:grpSpPr>
+      <p:sp>
+        <p:nvSpPr>
+          <p:cNvPr id="2" name="1 Marcador de contenido"/>
+          <p:cNvSpPr>
+            <a:spLocks noGrp="1"/>
+          </p:cNvSpPr>
+          <p:nvPr>
+            <p:ph idx="1"/>
+          </p:nvPr>
+        </p:nvSpPr>
+        <p:spPr/>
+        <p:txBody>
+          <a:bodyPr>
+            <a:normAutofit fontScale="92500"/>
+          </a:bodyPr>
+          <a:lstStyle/>
+          <a:p>
+            <a:pPr algn="just">
+              <a:lnSpc>
+                <a:spcPct val="90000"/>
+              </a:lnSpc>
+              <a:spcBef>
+                <a:spcPct val="20000"/>
+              </a:spcBef>
+            </a:pPr>
+            <a:r>
+              <a:rPr lang="es-ES" sz="2300" dirty="0" smtClean="0"/>
+              <a:t>Bytesoft es una empresa chilena</a:t>
+            </a:r>
+            <a:r>
+              <a:rPr lang="es-MX" sz="2300" dirty="0" smtClean="0"/>
+              <a:t>, del área de las Tecnologías de la Información, con 18 años en el mercado Nacional.</a:t>
+            </a:r>
+            <a:endParaRPr lang="es-ES" sz="2300" dirty="0" smtClean="0"/>
+          </a:p>
+          <a:p>
+            <a:pPr algn="just">
+              <a:lnSpc>
+                <a:spcPct val="90000"/>
+              </a:lnSpc>
+              <a:spcBef>
+                <a:spcPct val="20000"/>
+              </a:spcBef>
+            </a:pPr>
+            <a:endParaRPr lang="es-MX" sz="2300" dirty="0" smtClean="0"/>
+          </a:p>
+          <a:p>
+            <a:pPr algn="just">
+              <a:lnSpc>
+                <a:spcPct val="90000"/>
+              </a:lnSpc>
+              <a:spcBef>
+                <a:spcPct val="20000"/>
+              </a:spcBef>
+            </a:pPr>
+            <a:r>
+              <a:rPr lang="es-MX" sz="2300" dirty="0" smtClean="0"/>
+              <a:t>Posee</a:t>
+            </a:r>
+            <a:r>
+              <a:rPr lang="es-ES" sz="2300" dirty="0" smtClean="0"/>
+              <a:t> una sólida trayectoria profesional</a:t>
+            </a:r>
+            <a:r>
+              <a:rPr lang="es-MX" sz="2300" dirty="0" smtClean="0"/>
+              <a:t>, en áreas de Desarrollo de Software y Consultoría.</a:t>
+            </a:r>
+          </a:p>
+          <a:p>
+            <a:pPr algn="just">
+              <a:lnSpc>
+                <a:spcPct val="90000"/>
+              </a:lnSpc>
+              <a:spcBef>
+                <a:spcPct val="20000"/>
+              </a:spcBef>
+            </a:pPr>
+            <a:endParaRPr lang="es-MX" sz="2300" dirty="0" smtClean="0"/>
+          </a:p>
+          <a:p>
+            <a:pPr algn="just">
+              <a:lnSpc>
+                <a:spcPct val="90000"/>
+              </a:lnSpc>
+              <a:spcBef>
+                <a:spcPct val="20000"/>
+              </a:spcBef>
+            </a:pPr>
+            <a:r>
+              <a:rPr lang="es-MX" sz="2300" dirty="0" smtClean="0"/>
+              <a:t>Actualmente, su línea de productos incorpora, desarrollo de Proyectos de Software específicamente en Arquitecturas JEE (Java Enterprise Edition), Consultoría Tecnológica y Funcional en Módulos SAP R3, Desarrollo de Productos de Software y venta e implementación de Infraestructura, a objeto de </a:t>
+            </a:r>
+            <a:r>
+              <a:rPr lang="es-ES" sz="2300" dirty="0" smtClean="0"/>
+              <a:t>proveer</a:t>
+            </a:r>
+            <a:r>
+              <a:rPr lang="es-MX" sz="2300" dirty="0" smtClean="0"/>
+              <a:t> </a:t>
+            </a:r>
+            <a:r>
+              <a:rPr lang="es-ES" sz="2300" dirty="0" smtClean="0"/>
+              <a:t> soluciones integrales de </a:t>
+            </a:r>
+            <a:r>
+              <a:rPr lang="es-MX" sz="2300" dirty="0" smtClean="0"/>
+              <a:t>tecnología de la Información (TI).</a:t>
+            </a:r>
+            <a:endParaRPr lang="es-ES" sz="2300" dirty="0" smtClean="0"/>
+          </a:p>
+          <a:p>
+            <a:endParaRPr lang="es-CL" dirty="0"/>
+          </a:p>
+        </p:txBody>
+      </p:sp>
+      <p:sp>
+        <p:nvSpPr>
+          <p:cNvPr id="3" name="2 Título"/>
+          <p:cNvSpPr>
+            <a:spLocks noGrp="1"/>
+          </p:cNvSpPr>
+          <p:nvPr>
+            <p:ph type="title"/>
+          </p:nvPr>
+        </p:nvSpPr>
+        <p:spPr/>
+        <p:txBody>
+          <a:bodyPr/>
+          <a:lstStyle/>
+          <a:p>
+            <a:r>
+              <a:rPr lang="es-CL" dirty="0" smtClean="0"/>
+              <a:t>Nuestra Empresa</a:t>
+            </a:r>
+            <a:endParaRPr lang="es-CL" dirty="0"/>
+          </a:p>
+        </p:txBody>
+      </p:sp>
+    </p:spTree>
+  </p:cSld>
+  <p:clrMapOvr>
+    <a:masterClrMapping/>
+  </p:clrMapOvr>
+  <p:transition spd="slow">
+    <p:fade/>
+  </p:transition>
+  <p:timing>
+    <p:tnLst>
+      <p:par>
+        <p:cTn id="1" dur="indefinite" restart="never" nodeType="tmRoot"/>
+      </p:par>
+    </p:tnLst>
+  </p:timing>
+</p:sld>
+</file>
+
+<file path=ppt/slides/slide3.xml><?xml version="1.0" encoding="utf-8"?>
+<p:sld xmlns:a="http://schemas.openxmlformats.org/drawingml/2006/main" xmlns:r="http://schemas.openxmlformats.org/officeDocument/2006/relationships" xmlns:p="http://schemas.openxmlformats.org/presentationml/2006/main">
+  <p:cSld>
+    <p:spTree>
+      <p:nvGrpSpPr>
+        <p:cNvPr id="1" name=""/>
+        <p:cNvGrpSpPr/>
+        <p:nvPr/>
+      </p:nvGrpSpPr>
+      <p:grpSpPr>
+        <a:xfrm>
+          <a:off x="0" y="0"/>
+          <a:ext cx="0" cy="0"/>
+          <a:chOff x="0" y="0"/>
+          <a:chExt cx="0" cy="0"/>
+        </a:xfrm>
+      </p:grpSpPr>
+      <p:sp>
+        <p:nvSpPr>
+          <p:cNvPr id="2" name="1 Marcador de contenido"/>
+          <p:cNvSpPr>
+            <a:spLocks noGrp="1"/>
+          </p:cNvSpPr>
+          <p:nvPr>
+            <p:ph idx="1"/>
+          </p:nvPr>
+        </p:nvSpPr>
+        <p:spPr/>
+        <p:txBody>
+          <a:bodyPr/>
+          <a:lstStyle/>
+          <a:p>
+            <a:r>
+              <a:rPr lang="es-MX" sz="2300" dirty="0" smtClean="0"/>
+              <a:t>Agregar valor  y confianza a nuestros clientes, a través de soluciones tecnológicas que permitan hacer más eficiente la gestión del negocio de la empresa. </a:t>
+            </a:r>
+          </a:p>
+          <a:p>
+            <a:endParaRPr lang="es-CL" dirty="0"/>
+          </a:p>
+        </p:txBody>
+      </p:sp>
+      <p:sp>
+        <p:nvSpPr>
+          <p:cNvPr id="3" name="2 Título"/>
+          <p:cNvSpPr>
+            <a:spLocks noGrp="1"/>
+          </p:cNvSpPr>
+          <p:nvPr>
+            <p:ph type="title"/>
+          </p:nvPr>
+        </p:nvSpPr>
+        <p:spPr/>
+        <p:txBody>
+          <a:bodyPr/>
+          <a:lstStyle/>
+          <a:p>
+            <a:r>
+              <a:rPr lang="es-CL" dirty="0" smtClean="0"/>
+              <a:t>Nuestra </a:t>
+            </a:r>
+            <a:r>
+              <a:rPr lang="es-CL" dirty="0" err="1" smtClean="0"/>
+              <a:t>Mision</a:t>
+            </a:r>
+            <a:endParaRPr lang="es-CL" dirty="0"/>
+          </a:p>
+        </p:txBody>
+      </p:sp>
+      <p:pic>
+        <p:nvPicPr>
+          <p:cNvPr id="4" name="Picture 33" descr="5323_030818_79376"/>
+          <p:cNvPicPr>
+            <a:picLocks noChangeAspect="1" noChangeArrowheads="1"/>
+          </p:cNvPicPr>
+          <p:nvPr/>
+        </p:nvPicPr>
+        <p:blipFill>
+          <a:blip r:embed="rId2"/>
+          <a:srcRect/>
+          <a:stretch>
+            <a:fillRect/>
+          </a:stretch>
+        </p:blipFill>
+        <p:spPr bwMode="auto">
+          <a:xfrm>
+            <a:off x="6143636" y="3214686"/>
+            <a:ext cx="2286000" cy="1524000"/>
+          </a:xfrm>
+          <a:prstGeom prst="rect">
+            <a:avLst/>
+          </a:prstGeom>
+          <a:solidFill>
+            <a:srgbClr val="FFFFFF">
+              <a:shade val="85000"/>
+            </a:srgbClr>
+          </a:solidFill>
+          <a:ln w="88900" cap="sq">
+            <a:solidFill>
+              <a:srgbClr val="FFFFFF"/>
+            </a:solidFill>
+            <a:miter lim="800000"/>
+          </a:ln>
+          <a:effectLst>
+            <a:outerShdw blurRad="55000" dist="18000" dir="5400000" algn="tl" rotWithShape="0">
+              <a:srgbClr val="000000">
+                <a:alpha val="40000"/>
+              </a:srgbClr>
+            </a:outerShdw>
+          </a:effectLst>
+          <a:scene3d>
+            <a:camera prst="orthographicFront"/>
+            <a:lightRig rig="twoPt" dir="t">
+              <a:rot lat="0" lon="0" rev="7200000"/>
+            </a:lightRig>
+          </a:scene3d>
+          <a:sp3d>
+            <a:bevelT w="25400" h="19050"/>
+            <a:contourClr>
+              <a:srgbClr val="FFFFFF"/>
+            </a:contourClr>
+          </a:sp3d>
+        </p:spPr>
+      </p:pic>
+      <p:pic>
+        <p:nvPicPr>
+          <p:cNvPr id="5" name="Picture 32" descr="10197006"/>
+          <p:cNvPicPr>
+            <a:picLocks noChangeAspect="1" noChangeArrowheads="1"/>
+          </p:cNvPicPr>
+          <p:nvPr/>
+        </p:nvPicPr>
+        <p:blipFill>
+          <a:blip r:embed="rId3"/>
+          <a:srcRect/>
+          <a:stretch>
+            <a:fillRect/>
+          </a:stretch>
+        </p:blipFill>
+        <p:spPr bwMode="auto">
+          <a:xfrm>
+            <a:off x="3500446" y="4429132"/>
+            <a:ext cx="2286000" cy="1524000"/>
+          </a:xfrm>
+          <a:prstGeom prst="rect">
+            <a:avLst/>
+          </a:prstGeom>
+          <a:solidFill>
+            <a:srgbClr val="FFFFFF">
+              <a:shade val="85000"/>
+            </a:srgbClr>
+          </a:solidFill>
+          <a:ln w="88900" cap="sq">
+            <a:solidFill>
+              <a:srgbClr val="FFFFFF"/>
+            </a:solidFill>
+            <a:miter lim="800000"/>
+          </a:ln>
+          <a:effectLst>
+            <a:outerShdw blurRad="55000" dist="18000" dir="5400000" algn="tl" rotWithShape="0">
+              <a:srgbClr val="000000">
+                <a:alpha val="40000"/>
+              </a:srgbClr>
+            </a:outerShdw>
+          </a:effectLst>
+          <a:scene3d>
+            <a:camera prst="orthographicFront"/>
+            <a:lightRig rig="twoPt" dir="t">
+              <a:rot lat="0" lon="0" rev="7200000"/>
+            </a:lightRig>
+          </a:scene3d>
+          <a:sp3d>
+            <a:bevelT w="25400" h="19050"/>
+            <a:contourClr>
+              <a:srgbClr val="FFFFFF"/>
+            </a:contourClr>
+          </a:sp3d>
+        </p:spPr>
+      </p:pic>
+    </p:spTree>
+  </p:cSld>
+  <p:clrMapOvr>
+    <a:masterClrMapping/>
+  </p:clrMapOvr>
+  <p:transition spd="slow">
+    <p:fade/>
+  </p:transition>
+  <p:timing>
+    <p:tnLst>
+      <p:par>
+        <p:cTn id="1" dur="indefinite" restart="never" nodeType="tmRoot"/>
+      </p:par>
+    </p:tnLst>
+  </p:timing>
+</p:sld>
+</file>
+
+<file path=ppt/slides/slide4.xml><?xml version="1.0" encoding="utf-8"?>
+<p:sld xmlns:a="http://schemas.openxmlformats.org/drawingml/2006/main" xmlns:r="http://schemas.openxmlformats.org/officeDocument/2006/relationships" xmlns:p="http://schemas.openxmlformats.org/presentationml/2006/main">
+  <p:cSld>
+    <p:spTree>
+      <p:nvGrpSpPr>
+        <p:cNvPr id="1" name=""/>
+        <p:cNvGrpSpPr/>
+        <p:nvPr/>
+      </p:nvGrpSpPr>
+      <p:grpSpPr>
+        <a:xfrm>
+          <a:off x="0" y="0"/>
+          <a:ext cx="0" cy="0"/>
+          <a:chOff x="0" y="0"/>
+          <a:chExt cx="0" cy="0"/>
+        </a:xfrm>
+      </p:grpSpPr>
+      <p:sp>
+        <p:nvSpPr>
+          <p:cNvPr id="2" name="1 Marcador de contenido"/>
+          <p:cNvSpPr>
+            <a:spLocks noGrp="1"/>
+          </p:cNvSpPr>
+          <p:nvPr>
+            <p:ph idx="1"/>
+          </p:nvPr>
+        </p:nvSpPr>
+        <p:spPr/>
+        <p:txBody>
+          <a:bodyPr>
+            <a:normAutofit/>
+          </a:bodyPr>
+          <a:lstStyle/>
+          <a:p>
+            <a:r>
+              <a:rPr lang="es-CL" sz="2300" dirty="0" smtClean="0"/>
+              <a:t>Excelente Capacidad Técnica .</a:t>
+            </a:r>
+          </a:p>
+          <a:p>
+            <a:r>
+              <a:rPr lang="es-CL" sz="2300" dirty="0" smtClean="0"/>
+              <a:t>Alta Vocación de Servicio – Confianza.</a:t>
+            </a:r>
+          </a:p>
+          <a:p>
+            <a:r>
+              <a:rPr lang="es-CL" sz="2300" dirty="0" smtClean="0"/>
+              <a:t>Acceso a los distintos Fabricantes de  Infraestructura, Software y Soluciones.</a:t>
+            </a:r>
+          </a:p>
+          <a:p>
+            <a:r>
+              <a:rPr lang="es-CL" sz="2300" dirty="0" smtClean="0"/>
+              <a:t>Aplicación de Mejores Prácticas en la Industria.</a:t>
+            </a:r>
+          </a:p>
+          <a:p>
+            <a:r>
+              <a:rPr lang="es-CL" sz="2300" dirty="0" smtClean="0"/>
+              <a:t>Establecimiento de relaciones de largo plazo con nuestros Clientes – Credibilidad.</a:t>
+            </a:r>
+          </a:p>
+        </p:txBody>
+      </p:sp>
+      <p:sp>
+        <p:nvSpPr>
+          <p:cNvPr id="3" name="2 Título"/>
+          <p:cNvSpPr>
+            <a:spLocks noGrp="1"/>
+          </p:cNvSpPr>
+          <p:nvPr>
+            <p:ph type="title"/>
+          </p:nvPr>
+        </p:nvSpPr>
+        <p:spPr/>
+        <p:txBody>
+          <a:bodyPr>
+            <a:normAutofit/>
+          </a:bodyPr>
+          <a:lstStyle/>
+          <a:p>
+            <a:r>
+              <a:rPr lang="en-US" sz="4400" dirty="0" smtClean="0"/>
+              <a:t>Elementos </a:t>
+            </a:r>
+            <a:r>
+              <a:rPr lang="en-US" sz="4400" dirty="0" err="1" smtClean="0"/>
+              <a:t>Diferenciadores</a:t>
+            </a:r>
+            <a:endParaRPr lang="es-CL" dirty="0"/>
+          </a:p>
+        </p:txBody>
+      </p:sp>
+      <p:pic>
+        <p:nvPicPr>
+          <p:cNvPr id="4" name="Picture 12" descr="10189325"/>
+          <p:cNvPicPr>
+            <a:picLocks noChangeAspect="1" noChangeArrowheads="1"/>
+          </p:cNvPicPr>
+          <p:nvPr/>
+        </p:nvPicPr>
+        <p:blipFill>
+          <a:blip r:embed="rId2"/>
+          <a:srcRect/>
+          <a:stretch>
+            <a:fillRect/>
+          </a:stretch>
+        </p:blipFill>
+        <p:spPr>
+          <a:xfrm>
+            <a:off x="6000760" y="4500570"/>
+            <a:ext cx="2286000" cy="1524000"/>
+          </a:xfrm>
+          <a:prstGeom prst="rect">
+            <a:avLst/>
+          </a:prstGeom>
+          <a:solidFill>
+            <a:srgbClr val="FFFFFF">
+              <a:shade val="85000"/>
+            </a:srgbClr>
+          </a:solidFill>
+          <a:ln w="88900" cap="sq">
+            <a:solidFill>
+              <a:srgbClr val="FFFFFF"/>
+            </a:solidFill>
+            <a:miter lim="800000"/>
+          </a:ln>
+          <a:effectLst>
+            <a:outerShdw blurRad="55000" dist="18000" dir="5400000" algn="tl" rotWithShape="0">
+              <a:srgbClr val="000000">
+                <a:alpha val="40000"/>
+              </a:srgbClr>
+            </a:outerShdw>
+          </a:effectLst>
+          <a:scene3d>
+            <a:camera prst="orthographicFront"/>
+            <a:lightRig rig="twoPt" dir="t">
+              <a:rot lat="0" lon="0" rev="7200000"/>
+            </a:lightRig>
+          </a:scene3d>
+          <a:sp3d>
+            <a:bevelT w="25400" h="19050"/>
+            <a:contourClr>
+              <a:srgbClr val="FFFFFF"/>
+            </a:contourClr>
+          </a:sp3d>
+        </p:spPr>
+      </p:pic>
+    </p:spTree>
+  </p:cSld>
+  <p:clrMapOvr>
+    <a:masterClrMapping/>
+  </p:clrMapOvr>
+  <p:transition spd="slow">
+    <p:fade/>
+  </p:transition>
+  <p:timing>
+    <p:tnLst>
+      <p:par>
+        <p:cTn id="1" dur="indefinite" restart="never" nodeType="tmRoot"/>
+      </p:par>
+    </p:tnLst>
+  </p:timing>
+</p:sld>
+</file>
+
+<file path=ppt/slides/slide5.xml><?xml version="1.0" encoding="utf-8"?>
+<p:sld xmlns:a="http://schemas.openxmlformats.org/drawingml/2006/main" xmlns:r="http://schemas.openxmlformats.org/officeDocument/2006/relationships" xmlns:p="http://schemas.openxmlformats.org/presentationml/2006/main">
+  <p:cSld>
+    <p:spTree>
+      <p:nvGrpSpPr>
+        <p:cNvPr id="1" name=""/>
+        <p:cNvGrpSpPr/>
+        <p:nvPr/>
+      </p:nvGrpSpPr>
+      <p:grpSpPr>
+        <a:xfrm>
+          <a:off x="0" y="0"/>
+          <a:ext cx="0" cy="0"/>
+          <a:chOff x="0" y="0"/>
+          <a:chExt cx="0" cy="0"/>
+        </a:xfrm>
+      </p:grpSpPr>
+      <p:sp>
+        <p:nvSpPr>
+          <p:cNvPr id="2" name="1 Marcador de contenido"/>
+          <p:cNvSpPr>
+            <a:spLocks noGrp="1"/>
+          </p:cNvSpPr>
+          <p:nvPr>
+            <p:ph idx="1"/>
+          </p:nvPr>
+        </p:nvSpPr>
+        <p:spPr/>
+        <p:txBody>
+          <a:bodyPr/>
+          <a:lstStyle/>
+          <a:p>
+            <a:r>
+              <a:rPr lang="es-CL" sz="2300" dirty="0" smtClean="0"/>
+              <a:t>Adecuada relación Costo/Beneficio.</a:t>
+            </a:r>
+          </a:p>
+          <a:p>
+            <a:r>
+              <a:rPr lang="es-CL" sz="2300" dirty="0" smtClean="0"/>
+              <a:t>Optimizar los recursos y su utilización.</a:t>
+            </a:r>
+          </a:p>
+          <a:p>
+            <a:r>
+              <a:rPr lang="es-CL" sz="2300" dirty="0" smtClean="0"/>
+              <a:t>Calidad - aumento de productividad derivado del incremento de niveles de servicio.</a:t>
+            </a:r>
+          </a:p>
+          <a:p>
+            <a:r>
+              <a:rPr lang="es-CL" sz="2300" dirty="0" smtClean="0"/>
+              <a:t>Innovación- acelerar la adopción de nuevas  Tecnologías</a:t>
+            </a:r>
+          </a:p>
+          <a:p>
+            <a:pPr>
+              <a:buNone/>
+            </a:pPr>
+            <a:endParaRPr lang="es-CL" dirty="0"/>
+          </a:p>
+        </p:txBody>
+      </p:sp>
+      <p:sp>
+        <p:nvSpPr>
+          <p:cNvPr id="3" name="2 Título"/>
+          <p:cNvSpPr>
+            <a:spLocks noGrp="1"/>
+          </p:cNvSpPr>
+          <p:nvPr>
+            <p:ph type="title"/>
+          </p:nvPr>
+        </p:nvSpPr>
+        <p:spPr/>
+        <p:txBody>
+          <a:bodyPr>
+            <a:normAutofit/>
+          </a:bodyPr>
+          <a:lstStyle/>
+          <a:p>
+            <a:r>
+              <a:rPr lang="es-CL" sz="4400" dirty="0" smtClean="0"/>
+              <a:t>Beneficios para el Cliente</a:t>
+            </a:r>
+            <a:endParaRPr lang="es-CL" dirty="0"/>
+          </a:p>
+        </p:txBody>
+      </p:sp>
+      <p:pic>
+        <p:nvPicPr>
+          <p:cNvPr id="4" name="Picture 40" descr="5344_031121_118471"/>
+          <p:cNvPicPr>
+            <a:picLocks noChangeAspect="1" noChangeArrowheads="1"/>
+          </p:cNvPicPr>
+          <p:nvPr/>
+        </p:nvPicPr>
+        <p:blipFill>
+          <a:blip r:embed="rId2"/>
+          <a:srcRect/>
+          <a:stretch>
+            <a:fillRect/>
+          </a:stretch>
+        </p:blipFill>
+        <p:spPr bwMode="auto">
+          <a:xfrm>
+            <a:off x="3286116" y="3762388"/>
+            <a:ext cx="2286000" cy="1524000"/>
+          </a:xfrm>
+          <a:prstGeom prst="rect">
+            <a:avLst/>
+          </a:prstGeom>
+          <a:solidFill>
+            <a:srgbClr val="FFFFFF">
+              <a:shade val="85000"/>
+            </a:srgbClr>
+          </a:solidFill>
+          <a:ln w="88900" cap="sq">
+            <a:solidFill>
+              <a:srgbClr val="FFFFFF"/>
+            </a:solidFill>
+            <a:miter lim="800000"/>
+          </a:ln>
+          <a:effectLst>
+            <a:outerShdw blurRad="55000" dist="18000" dir="5400000" algn="tl" rotWithShape="0">
+              <a:srgbClr val="000000">
+                <a:alpha val="40000"/>
+              </a:srgbClr>
+            </a:outerShdw>
+          </a:effectLst>
+          <a:scene3d>
+            <a:camera prst="orthographicFront"/>
+            <a:lightRig rig="twoPt" dir="t">
+              <a:rot lat="0" lon="0" rev="7200000"/>
+            </a:lightRig>
+          </a:scene3d>
+          <a:sp3d>
+            <a:bevelT w="25400" h="19050"/>
+            <a:contourClr>
+              <a:srgbClr val="FFFFFF"/>
+            </a:contourClr>
+          </a:sp3d>
+        </p:spPr>
+      </p:pic>
+      <p:pic>
+        <p:nvPicPr>
+          <p:cNvPr id="5" name="Picture 41" descr="5344_031121_118470"/>
+          <p:cNvPicPr>
+            <a:picLocks noChangeAspect="1" noChangeArrowheads="1"/>
+          </p:cNvPicPr>
+          <p:nvPr/>
+        </p:nvPicPr>
+        <p:blipFill>
+          <a:blip r:embed="rId3"/>
+          <a:srcRect/>
+          <a:stretch>
+            <a:fillRect/>
+          </a:stretch>
+        </p:blipFill>
+        <p:spPr bwMode="auto">
+          <a:xfrm>
+            <a:off x="6072198" y="5000636"/>
+            <a:ext cx="2286000" cy="1458913"/>
+          </a:xfrm>
+          <a:prstGeom prst="rect">
+            <a:avLst/>
+          </a:prstGeom>
+          <a:solidFill>
+            <a:srgbClr val="FFFFFF">
+              <a:shade val="85000"/>
+            </a:srgbClr>
+          </a:solidFill>
+          <a:ln w="88900" cap="sq">
+            <a:solidFill>
+              <a:srgbClr val="FFFFFF"/>
+            </a:solidFill>
+            <a:miter lim="800000"/>
+          </a:ln>
+          <a:effectLst>
+            <a:outerShdw blurRad="55000" dist="18000" dir="5400000" algn="tl" rotWithShape="0">
+              <a:srgbClr val="000000">
+                <a:alpha val="40000"/>
+              </a:srgbClr>
+            </a:outerShdw>
+          </a:effectLst>
+          <a:scene3d>
+            <a:camera prst="orthographicFront"/>
+            <a:lightRig rig="twoPt" dir="t">
+              <a:rot lat="0" lon="0" rev="7200000"/>
+            </a:lightRig>
+          </a:scene3d>
+          <a:sp3d>
+            <a:bevelT w="25400" h="19050"/>
+            <a:contourClr>
+              <a:srgbClr val="FFFFFF"/>
+            </a:contourClr>
+          </a:sp3d>
+        </p:spPr>
+      </p:pic>
+    </p:spTree>
+  </p:cSld>
+  <p:clrMapOvr>
+    <a:masterClrMapping/>
+  </p:clrMapOvr>
+  <p:transition spd="slow">
+    <p:fade/>
+  </p:transition>
+  <p:timing>
+    <p:tnLst>
+      <p:par>
+        <p:cTn id="1" dur="indefinite" restart="never" nodeType="tmRoot"/>
+      </p:par>
+    </p:tnLst>
+  </p:timing>
+</p:sld>
+</file>
+
+<file path=ppt/slides/slide6.xml><?xml version="1.0" encoding="utf-8"?>
+<p:sld xmlns:a="http://schemas.openxmlformats.org/drawingml/2006/main" xmlns:r="http://schemas.openxmlformats.org/officeDocument/2006/relationships" xmlns:p="http://schemas.openxmlformats.org/presentationml/2006/main">
+  <p:cSld>
+    <p:spTree>
+      <p:nvGrpSpPr>
+        <p:cNvPr id="1" name=""/>
+        <p:cNvGrpSpPr/>
+        <p:nvPr/>
+      </p:nvGrpSpPr>
+      <p:grpSpPr>
+        <a:xfrm>
+          <a:off x="0" y="0"/>
+          <a:ext cx="0" cy="0"/>
+          <a:chOff x="0" y="0"/>
+          <a:chExt cx="0" cy="0"/>
+        </a:xfrm>
+      </p:grpSpPr>
+      <p:sp>
+        <p:nvSpPr>
+          <p:cNvPr id="3" name="2 Marcador de contenido"/>
+          <p:cNvSpPr>
+            <a:spLocks noGrp="1"/>
+          </p:cNvSpPr>
+          <p:nvPr>
+            <p:ph idx="1"/>
+          </p:nvPr>
+        </p:nvSpPr>
+        <p:spPr/>
+        <p:txBody>
+          <a:bodyPr>
+            <a:noAutofit/>
+          </a:bodyPr>
+          <a:lstStyle/>
+          <a:p>
+            <a:pPr algn="just"/>
+            <a:r>
+              <a:rPr lang="es-CL" sz="2300" dirty="0" smtClean="0"/>
+              <a:t>Según la normativa de la Súper Intendencia de Valores y Seguros. Los estados financieros deberán prepararse de acuerdo a las Normas Internacionales de Información Financiera (IFRS) emitidas por la International Accounting Standard Board (IASB).</a:t>
+            </a:r>
+          </a:p>
+          <a:p>
+            <a:pPr algn="just"/>
+            <a:endParaRPr lang="es-CL" sz="2300" dirty="0" smtClean="0"/>
+          </a:p>
+          <a:p>
+            <a:pPr algn="just"/>
+            <a:r>
+              <a:rPr lang="es-CL" sz="2300" dirty="0" smtClean="0"/>
+              <a:t>Adicionalmente la SVS especifica que las entidades aseguradoras deben divulgar información que no esta directamente reflejada en dichos Estados Financieros. Esta información llamada Revelaciones deberá ser presentada con carácter de obligatoria.</a:t>
+            </a:r>
+          </a:p>
+          <a:p>
+            <a:pPr algn="just"/>
+            <a:endParaRPr lang="es-CL" sz="2300" dirty="0" smtClean="0"/>
+          </a:p>
+        </p:txBody>
+      </p:sp>
+      <p:sp>
+        <p:nvSpPr>
+          <p:cNvPr id="2" name="1 Título"/>
+          <p:cNvSpPr>
+            <a:spLocks noGrp="1"/>
+          </p:cNvSpPr>
+          <p:nvPr>
+            <p:ph type="title"/>
+          </p:nvPr>
+        </p:nvSpPr>
+        <p:spPr/>
+        <p:txBody>
+          <a:bodyPr>
+            <a:normAutofit fontScale="90000"/>
+          </a:bodyPr>
+          <a:lstStyle/>
+          <a:p>
+            <a:r>
+              <a:rPr lang="es-CL" dirty="0" smtClean="0"/>
+              <a:t>El Problema de las Revelaciones, los EE.FF y el XBRL.</a:t>
+            </a:r>
+            <a:endParaRPr lang="es-CL" dirty="0"/>
+          </a:p>
+        </p:txBody>
+      </p:sp>
+    </p:spTree>
+  </p:cSld>
+  <p:clrMapOvr>
+    <a:masterClrMapping/>
+  </p:clrMapOvr>
+  <p:transition spd="slow">
+    <p:fade/>
+  </p:transition>
+  <p:timing>
+    <p:tnLst>
+      <p:par>
+        <p:cTn id="1" dur="indefinite" restart="never" nodeType="tmRoot"/>
+      </p:par>
+    </p:tnLst>
+  </p:timing>
+</p:sld>
+</file>
+
+<file path=ppt/slides/slide7.xml><?xml version="1.0" encoding="utf-8"?>
+<p:sld xmlns:a="http://schemas.openxmlformats.org/drawingml/2006/main" xmlns:r="http://schemas.openxmlformats.org/officeDocument/2006/relationships" xmlns:p="http://schemas.openxmlformats.org/presentationml/2006/main">
+  <p:cSld>
+    <p:spTree>
+      <p:nvGrpSpPr>
+        <p:cNvPr id="1" name=""/>
+        <p:cNvGrpSpPr/>
+        <p:nvPr/>
+      </p:nvGrpSpPr>
+      <p:grpSpPr>
+        <a:xfrm>
+          <a:off x="0" y="0"/>
+          <a:ext cx="0" cy="0"/>
+          <a:chOff x="0" y="0"/>
+          <a:chExt cx="0" cy="0"/>
+        </a:xfrm>
+      </p:grpSpPr>
+      <p:sp>
+        <p:nvSpPr>
+          <p:cNvPr id="2" name="1 Marcador de contenido"/>
+          <p:cNvSpPr>
+            <a:spLocks noGrp="1"/>
+          </p:cNvSpPr>
+          <p:nvPr>
+            <p:ph idx="1"/>
+          </p:nvPr>
+        </p:nvSpPr>
+        <p:spPr>
+          <a:xfrm>
+            <a:off x="428596" y="500042"/>
+            <a:ext cx="8229600" cy="5386603"/>
+          </a:xfrm>
+        </p:spPr>
+        <p:txBody>
+          <a:bodyPr>
+            <a:noAutofit/>
+          </a:bodyPr>
+          <a:lstStyle/>
+          <a:p>
+            <a:pPr algn="just"/>
+            <a:r>
+              <a:rPr lang="es-CL" sz="2200" dirty="0" smtClean="0"/>
+              <a:t>Desde el nacimiento de la normativa con la circular 2022 en Mayo del 2011, existen hasta la fecha 3 modificaciones en la definición de la normativa impactando directamente en la estructura y contenido de las Revelaciones. Esto implica un alto porcentaje de variabilidad de la información que se debe preparar y presentar.</a:t>
+            </a:r>
+          </a:p>
+          <a:p>
+            <a:pPr algn="just"/>
+            <a:endParaRPr lang="es-CL" sz="2200" dirty="0" smtClean="0"/>
+          </a:p>
+          <a:p>
+            <a:pPr algn="just"/>
+            <a:r>
+              <a:rPr lang="es-CL" sz="2200" dirty="0" smtClean="0"/>
+              <a:t>Tomando en cuenta esta y otras atenuantes nuestra Compañía ha desarrollado un producto totalmente </a:t>
+            </a:r>
+            <a:r>
+              <a:rPr lang="es-CL" sz="2200" u="sng" dirty="0" smtClean="0"/>
+              <a:t>versátil</a:t>
+            </a:r>
+            <a:r>
+              <a:rPr lang="es-CL" sz="2200" dirty="0" smtClean="0"/>
+              <a:t> que se ajusta a todos los posibles escenarios impuestos por la Súper Intendencia de Valores y Seguros, brindando una capacidad de adaptación único a la hora de enfrentar los cambios en los modelos de entrega de la información de Revelaciones, Estados Financieros y Generación de XBRL.</a:t>
+            </a:r>
+            <a:endParaRPr lang="es-CL" sz="2200" dirty="0"/>
+          </a:p>
+        </p:txBody>
+      </p:sp>
+    </p:spTree>
+  </p:cSld>
+  <p:clrMapOvr>
+    <a:masterClrMapping/>
+  </p:clrMapOvr>
+  <p:transition spd="slow">
+    <p:fade/>
+  </p:transition>
+  <p:timing>
+    <p:tnLst>
+      <p:par>
+        <p:cTn id="1" dur="indefinite" restart="never" nodeType="tmRoot"/>
+      </p:par>
+    </p:tnLst>
+  </p:timing>
+</p:sld>
+</file>
+
+<file path=ppt/slides/slide8.xml><?xml version="1.0" encoding="utf-8"?>
+<p:sld xmlns:a="http://schemas.openxmlformats.org/drawingml/2006/main" xmlns:r="http://schemas.openxmlformats.org/officeDocument/2006/relationships" xmlns:p="http://schemas.openxmlformats.org/presentationml/2006/main">
+  <p:cSld>
+    <p:spTree>
+      <p:nvGrpSpPr>
+        <p:cNvPr id="1" name=""/>
+        <p:cNvGrpSpPr/>
+        <p:nvPr/>
+      </p:nvGrpSpPr>
+      <p:grpSpPr>
+        <a:xfrm>
+          <a:off x="0" y="0"/>
+          <a:ext cx="0" cy="0"/>
+          <a:chOff x="0" y="0"/>
+          <a:chExt cx="0" cy="0"/>
+        </a:xfrm>
+      </p:grpSpPr>
+      <p:sp>
+        <p:nvSpPr>
+          <p:cNvPr id="2" name="1 Marcador de contenido"/>
+          <p:cNvSpPr>
+            <a:spLocks noGrp="1"/>
+          </p:cNvSpPr>
+          <p:nvPr>
+            <p:ph idx="1"/>
+          </p:nvPr>
+        </p:nvSpPr>
+        <p:spPr/>
+        <p:txBody>
+          <a:bodyPr>
+            <a:normAutofit lnSpcReduction="10000"/>
+          </a:bodyPr>
+          <a:lstStyle/>
+          <a:p>
+            <a:pPr algn="just"/>
+            <a:r>
+              <a:rPr lang="es-CL" sz="2300" dirty="0" smtClean="0"/>
+              <a:t>Totalmente Versátil, se adapta sin problemas a las distintas especificaciones de la normativa permitiendo superar sin dificultades las problemáticas asociadas los cambios sobre forma y contenido de las Revelaciones.</a:t>
+            </a:r>
+          </a:p>
+          <a:p>
+            <a:pPr algn="just"/>
+            <a:r>
+              <a:rPr lang="es-CL" sz="2300" dirty="0" smtClean="0"/>
+              <a:t>Posee su propio modulo de </a:t>
+            </a:r>
+            <a:r>
+              <a:rPr lang="es-CL" sz="2300" dirty="0" smtClean="0">
+                <a:effectLst>
+                  <a:outerShdw blurRad="38100" dist="38100" dir="2700000" algn="tl">
+                    <a:srgbClr val="000000">
+                      <a:alpha val="43137"/>
+                    </a:srgbClr>
+                  </a:outerShdw>
+                </a:effectLst>
+              </a:rPr>
+              <a:t>Generación de XBRL</a:t>
+            </a:r>
+            <a:r>
+              <a:rPr lang="es-CL" sz="2300" dirty="0" smtClean="0"/>
+              <a:t> el cual independiza a la empresa de los proveedores externos al momento de generar el envió de XBRL a la SVS.</a:t>
+            </a:r>
+          </a:p>
+          <a:p>
+            <a:pPr algn="just"/>
+            <a:r>
+              <a:rPr lang="es-CL" sz="2300" dirty="0" smtClean="0"/>
+              <a:t>Proporciona herramientas de Control que permiten tener una visión amplia sobre el estado del completitud de los datos para los periodos informados.</a:t>
+            </a:r>
+          </a:p>
+          <a:p>
+            <a:endParaRPr lang="es-CL" sz="2300" dirty="0" smtClean="0"/>
+          </a:p>
+          <a:p>
+            <a:pPr algn="just"/>
+            <a:endParaRPr lang="es-CL" sz="2300" dirty="0" smtClean="0"/>
+          </a:p>
+          <a:p>
+            <a:pPr algn="just"/>
+            <a:endParaRPr lang="es-CL" sz="2300" dirty="0" smtClean="0"/>
+          </a:p>
+          <a:p>
+            <a:pPr algn="just"/>
+            <a:endParaRPr lang="es-CL" sz="2300" dirty="0" smtClean="0"/>
+          </a:p>
+          <a:p>
+            <a:pPr algn="just"/>
+            <a:endParaRPr lang="es-CL" sz="2300" dirty="0" smtClean="0"/>
+          </a:p>
+          <a:p>
+            <a:pPr algn="just"/>
+            <a:endParaRPr lang="es-CL" sz="2300" dirty="0" smtClean="0"/>
+          </a:p>
+        </p:txBody>
+      </p:sp>
+      <p:sp>
+        <p:nvSpPr>
+          <p:cNvPr id="3" name="2 Título"/>
+          <p:cNvSpPr>
+            <a:spLocks noGrp="1"/>
+          </p:cNvSpPr>
+          <p:nvPr>
+            <p:ph type="title"/>
+          </p:nvPr>
+        </p:nvSpPr>
+        <p:spPr/>
+        <p:txBody>
+          <a:bodyPr/>
+          <a:lstStyle/>
+          <a:p>
+            <a:r>
+              <a:rPr lang="es-CL" dirty="0" smtClean="0"/>
+              <a:t>Principales Características</a:t>
+            </a:r>
+            <a:endParaRPr lang="es-CL" dirty="0"/>
+          </a:p>
+        </p:txBody>
+      </p:sp>
+    </p:spTree>
+  </p:cSld>
+  <p:clrMapOvr>
+    <a:masterClrMapping/>
+  </p:clrMapOvr>
+  <p:transition spd="slow">
+    <p:fade/>
+  </p:transition>
+  <p:timing>
+    <p:tnLst>
+      <p:par>
+        <p:cTn id="1" dur="indefinite" restart="never" nodeType="tmRoot"/>
+      </p:par>
+    </p:tnLst>
+  </p:timing>
+</p:sld>
+</file>
+
+<file path=ppt/slides/slide9.xml><?xml version="1.0" encoding="utf-8"?>
+<p:sld xmlns:a="http://schemas.openxmlformats.org/drawingml/2006/main" xmlns:r="http://schemas.openxmlformats.org/officeDocument/2006/relationships" xmlns:p="http://schemas.openxmlformats.org/presentationml/2006/main">
+  <p:cSld>
+    <p:spTree>
+      <p:nvGrpSpPr>
+        <p:cNvPr id="1" name=""/>
+        <p:cNvGrpSpPr/>
+        <p:nvPr/>
+      </p:nvGrpSpPr>
+      <p:grpSpPr>
+        <a:xfrm>
+          <a:off x="0" y="0"/>
+          <a:ext cx="0" cy="0"/>
+          <a:chOff x="0" y="0"/>
+          <a:chExt cx="0" cy="0"/>
+        </a:xfrm>
+      </p:grpSpPr>
+      <p:sp>
+        <p:nvSpPr>
+          <p:cNvPr id="2" name="1 Marcador de contenido"/>
+          <p:cNvSpPr>
+            <a:spLocks noGrp="1"/>
+          </p:cNvSpPr>
+          <p:nvPr>
+            <p:ph idx="1"/>
+          </p:nvPr>
+        </p:nvSpPr>
+        <p:spPr>
+          <a:xfrm>
+            <a:off x="428596" y="571480"/>
+            <a:ext cx="8229600" cy="4525963"/>
+          </a:xfrm>
+        </p:spPr>
+        <p:txBody>
+          <a:bodyPr>
+            <a:normAutofit/>
+          </a:bodyPr>
+          <a:lstStyle/>
+          <a:p>
+            <a:pPr algn="just"/>
+            <a:r>
+              <a:rPr lang="es-CL" sz="2300" dirty="0" smtClean="0"/>
+              <a:t>Interfaz Amigable y Usable.</a:t>
+            </a:r>
+          </a:p>
+          <a:p>
+            <a:pPr algn="just"/>
+            <a:r>
+              <a:rPr lang="es-CL" sz="2300" dirty="0" smtClean="0"/>
+              <a:t>Configurable y parametrizable.</a:t>
+            </a:r>
+          </a:p>
+          <a:p>
+            <a:pPr algn="just"/>
+            <a:r>
+              <a:rPr lang="es-CL" sz="2300" dirty="0" smtClean="0"/>
+              <a:t>Disponible en Intranet y 100% Web.</a:t>
+            </a:r>
+          </a:p>
+          <a:p>
+            <a:pPr algn="just"/>
+            <a:r>
+              <a:rPr lang="es-CL" sz="2300" dirty="0" smtClean="0"/>
+              <a:t>Este producto entrega una solución concreta a los procesos de obtención, administración, gestión y almacenamiento integral de toda la información involucrada en las Revelaciones según la norma IFRS.</a:t>
+            </a:r>
+            <a:endParaRPr lang="es-CL" sz="2300" dirty="0"/>
+          </a:p>
+        </p:txBody>
+      </p:sp>
+    </p:spTree>
+  </p:cSld>
+  <p:clrMapOvr>
+    <a:masterClrMapping/>
+  </p:clrMapOvr>
+  <p:transition spd="slow">
+    <p:fade/>
+  </p:transition>
   <p:timing>
     <p:tnLst>
       <p:par>

</xml_diff>